<commit_message>
fixed some stuff in file
</commit_message>
<xml_diff>
--- a/6.7201 Poster.pptx
+++ b/6.7201 Poster.pptx
@@ -4897,10 +4897,10 @@
       </p:sp>
       <p:pic>
         <p:nvPicPr>
-          <p:cNvPr id="44" name="Picture 43">
+          <p:cNvPr id="46" name="Picture 45">
             <a:extLst>
               <a:ext uri="{FF2B5EF4-FFF2-40B4-BE49-F238E27FC236}">
-                <a16:creationId xmlns:a16="http://schemas.microsoft.com/office/drawing/2014/main" id="{4E83A762-A8B5-4EC0-B952-19E6841D6261}"/>
+                <a16:creationId xmlns:a16="http://schemas.microsoft.com/office/drawing/2014/main" id="{FBCA8353-6919-40F3-A4E1-62BB0D515BB5}"/>
               </a:ext>
             </a:extLst>
           </p:cNvPr>
@@ -4923,8 +4923,8 @@
         </p:blipFill>
         <p:spPr>
           <a:xfrm>
-            <a:off x="11566538" y="10306929"/>
-            <a:ext cx="10151824" cy="3790536"/>
+            <a:off x="12200263" y="4878328"/>
+            <a:ext cx="4106537" cy="3051167"/>
           </a:xfrm>
           <a:prstGeom prst="rect">
             <a:avLst/>
@@ -4933,10 +4933,10 @@
       </p:pic>
       <p:pic>
         <p:nvPicPr>
-          <p:cNvPr id="46" name="Picture 45">
+          <p:cNvPr id="48" name="Picture 47">
             <a:extLst>
               <a:ext uri="{FF2B5EF4-FFF2-40B4-BE49-F238E27FC236}">
-                <a16:creationId xmlns:a16="http://schemas.microsoft.com/office/drawing/2014/main" id="{FBCA8353-6919-40F3-A4E1-62BB0D515BB5}"/>
+                <a16:creationId xmlns:a16="http://schemas.microsoft.com/office/drawing/2014/main" id="{4CDC52AB-F328-4671-B048-886BBAF47770}"/>
               </a:ext>
             </a:extLst>
           </p:cNvPr>
@@ -4959,7 +4959,7 @@
         </p:blipFill>
         <p:spPr>
           <a:xfrm>
-            <a:off x="12200263" y="4878328"/>
+            <a:off x="16772263" y="4878328"/>
             <a:ext cx="4106537" cy="3051167"/>
           </a:xfrm>
           <a:prstGeom prst="rect">
@@ -4969,10 +4969,10 @@
       </p:pic>
       <p:pic>
         <p:nvPicPr>
-          <p:cNvPr id="48" name="Picture 47">
+          <p:cNvPr id="50" name="Picture 49">
             <a:extLst>
               <a:ext uri="{FF2B5EF4-FFF2-40B4-BE49-F238E27FC236}">
-                <a16:creationId xmlns:a16="http://schemas.microsoft.com/office/drawing/2014/main" id="{4CDC52AB-F328-4671-B048-886BBAF47770}"/>
+                <a16:creationId xmlns:a16="http://schemas.microsoft.com/office/drawing/2014/main" id="{177EBF4C-DEA5-41DE-A963-966CB8E9B724}"/>
               </a:ext>
             </a:extLst>
           </p:cNvPr>
@@ -4995,8 +4995,8 @@
         </p:blipFill>
         <p:spPr>
           <a:xfrm>
-            <a:off x="16772263" y="4878328"/>
-            <a:ext cx="4106537" cy="3051167"/>
+            <a:off x="16297419" y="14173200"/>
+            <a:ext cx="5094267" cy="3790536"/>
           </a:xfrm>
           <a:prstGeom prst="rect">
             <a:avLst/>
@@ -5005,10 +5005,10 @@
       </p:pic>
       <p:pic>
         <p:nvPicPr>
-          <p:cNvPr id="50" name="Picture 49">
+          <p:cNvPr id="52" name="Picture 51">
             <a:extLst>
               <a:ext uri="{FF2B5EF4-FFF2-40B4-BE49-F238E27FC236}">
-                <a16:creationId xmlns:a16="http://schemas.microsoft.com/office/drawing/2014/main" id="{177EBF4C-DEA5-41DE-A963-966CB8E9B724}"/>
+                <a16:creationId xmlns:a16="http://schemas.microsoft.com/office/drawing/2014/main" id="{704A25DC-786D-410A-BB64-4E5422C3E591}"/>
               </a:ext>
             </a:extLst>
           </p:cNvPr>
@@ -5031,8 +5031,8 @@
         </p:blipFill>
         <p:spPr>
           <a:xfrm>
-            <a:off x="16297419" y="14173200"/>
-            <a:ext cx="5094267" cy="3790536"/>
+            <a:off x="11511523" y="10243520"/>
+            <a:ext cx="10219659" cy="3815865"/>
           </a:xfrm>
           <a:prstGeom prst="rect">
             <a:avLst/>

</xml_diff>